<commit_message>
Cross-check style rules with PPT
</commit_message>
<xml_diff>
--- a/misc/designs.pptx
+++ b/misc/designs.pptx
@@ -5,8 +5,10 @@
     <p:sldMasterId id="2147483672" r:id="rId1"/>
   </p:sldMasterIdLst>
   <p:sldIdLst>
-    <p:sldId id="257" r:id="rId2"/>
-    <p:sldId id="258" r:id="rId3"/>
+    <p:sldId id="262" r:id="rId2"/>
+    <p:sldId id="261" r:id="rId3"/>
+    <p:sldId id="257" r:id="rId4"/>
+    <p:sldId id="258" r:id="rId5"/>
   </p:sldIdLst>
   <p:sldSz cx="6858000" cy="9906000" type="A4"/>
   <p:notesSz cx="6858000" cy="9144000"/>
@@ -2977,6 +2979,470 @@
           <p:cNvPr id="3" name="Picture 2">
             <a:extLst>
               <a:ext uri="{FF2B5EF4-FFF2-40B4-BE49-F238E27FC236}">
+                <a16:creationId xmlns:a16="http://schemas.microsoft.com/office/drawing/2014/main" id="{F9158AFC-3888-4F8C-B71C-46C9EF99B64C}"/>
+              </a:ext>
+            </a:extLst>
+          </p:cNvPr>
+          <p:cNvPicPr>
+            <a:picLocks noChangeAspect="1"/>
+          </p:cNvPicPr>
+          <p:nvPr/>
+        </p:nvPicPr>
+        <p:blipFill>
+          <a:blip r:embed="rId2">
+            <a:extLst>
+              <a:ext uri="{28A0092B-C50C-407E-A947-70E740481C1C}">
+                <a14:useLocalDpi xmlns:a14="http://schemas.microsoft.com/office/drawing/2010/main" val="0"/>
+              </a:ext>
+            </a:extLst>
+          </a:blip>
+          <a:stretch>
+            <a:fillRect/>
+          </a:stretch>
+        </p:blipFill>
+        <p:spPr>
+          <a:xfrm>
+            <a:off x="0" y="759148"/>
+            <a:ext cx="6858000" cy="8387704"/>
+          </a:xfrm>
+          <a:prstGeom prst="rect">
+            <a:avLst/>
+          </a:prstGeom>
+        </p:spPr>
+      </p:pic>
+      <p:sp>
+        <p:nvSpPr>
+          <p:cNvPr id="2" name="Rectangle 1">
+            <a:extLst>
+              <a:ext uri="{FF2B5EF4-FFF2-40B4-BE49-F238E27FC236}">
+                <a16:creationId xmlns:a16="http://schemas.microsoft.com/office/drawing/2014/main" id="{28B2456B-19A5-48D1-836F-371DF9263F09}"/>
+              </a:ext>
+            </a:extLst>
+          </p:cNvPr>
+          <p:cNvSpPr/>
+          <p:nvPr/>
+        </p:nvSpPr>
+        <p:spPr>
+          <a:xfrm>
+            <a:off x="67733" y="1498600"/>
+            <a:ext cx="4216400" cy="626533"/>
+          </a:xfrm>
+          <a:prstGeom prst="rect">
+            <a:avLst/>
+          </a:prstGeom>
+        </p:spPr>
+        <p:style>
+          <a:lnRef idx="2">
+            <a:schemeClr val="accent1">
+              <a:shade val="50000"/>
+            </a:schemeClr>
+          </a:lnRef>
+          <a:fillRef idx="1">
+            <a:schemeClr val="accent1"/>
+          </a:fillRef>
+          <a:effectRef idx="0">
+            <a:schemeClr val="accent1"/>
+          </a:effectRef>
+          <a:fontRef idx="minor">
+            <a:schemeClr val="lt1"/>
+          </a:fontRef>
+        </p:style>
+        <p:txBody>
+          <a:bodyPr rtlCol="0" anchor="ctr"/>
+          <a:lstStyle/>
+          <a:p>
+            <a:pPr algn="ctr"/>
+            <a:endParaRPr lang="en-PH"/>
+          </a:p>
+        </p:txBody>
+      </p:sp>
+      <p:sp>
+        <p:nvSpPr>
+          <p:cNvPr id="4" name="Rectangle 3">
+            <a:extLst>
+              <a:ext uri="{FF2B5EF4-FFF2-40B4-BE49-F238E27FC236}">
+                <a16:creationId xmlns:a16="http://schemas.microsoft.com/office/drawing/2014/main" id="{E701F781-9418-461D-9AFE-1C58C7FB1005}"/>
+              </a:ext>
+            </a:extLst>
+          </p:cNvPr>
+          <p:cNvSpPr/>
+          <p:nvPr/>
+        </p:nvSpPr>
+        <p:spPr>
+          <a:xfrm>
+            <a:off x="152400" y="5486400"/>
+            <a:ext cx="4216400" cy="626533"/>
+          </a:xfrm>
+          <a:prstGeom prst="rect">
+            <a:avLst/>
+          </a:prstGeom>
+        </p:spPr>
+        <p:style>
+          <a:lnRef idx="2">
+            <a:schemeClr val="accent1">
+              <a:shade val="50000"/>
+            </a:schemeClr>
+          </a:lnRef>
+          <a:fillRef idx="1">
+            <a:schemeClr val="accent1"/>
+          </a:fillRef>
+          <a:effectRef idx="0">
+            <a:schemeClr val="accent1"/>
+          </a:effectRef>
+          <a:fontRef idx="minor">
+            <a:schemeClr val="lt1"/>
+          </a:fontRef>
+        </p:style>
+        <p:txBody>
+          <a:bodyPr rtlCol="0" anchor="ctr"/>
+          <a:lstStyle/>
+          <a:p>
+            <a:pPr algn="ctr"/>
+            <a:endParaRPr lang="en-PH"/>
+          </a:p>
+        </p:txBody>
+      </p:sp>
+      <p:sp>
+        <p:nvSpPr>
+          <p:cNvPr id="5" name="Rectangle 4">
+            <a:extLst>
+              <a:ext uri="{FF2B5EF4-FFF2-40B4-BE49-F238E27FC236}">
+                <a16:creationId xmlns:a16="http://schemas.microsoft.com/office/drawing/2014/main" id="{84D70D8D-D53C-470E-85F6-96EA6326FBD1}"/>
+              </a:ext>
+            </a:extLst>
+          </p:cNvPr>
+          <p:cNvSpPr/>
+          <p:nvPr/>
+        </p:nvSpPr>
+        <p:spPr>
+          <a:xfrm>
+            <a:off x="152400" y="7255934"/>
+            <a:ext cx="4216400" cy="626533"/>
+          </a:xfrm>
+          <a:prstGeom prst="rect">
+            <a:avLst/>
+          </a:prstGeom>
+        </p:spPr>
+        <p:style>
+          <a:lnRef idx="2">
+            <a:schemeClr val="accent1">
+              <a:shade val="50000"/>
+            </a:schemeClr>
+          </a:lnRef>
+          <a:fillRef idx="1">
+            <a:schemeClr val="accent1"/>
+          </a:fillRef>
+          <a:effectRef idx="0">
+            <a:schemeClr val="accent1"/>
+          </a:effectRef>
+          <a:fontRef idx="minor">
+            <a:schemeClr val="lt1"/>
+          </a:fontRef>
+        </p:style>
+        <p:txBody>
+          <a:bodyPr rtlCol="0" anchor="ctr"/>
+          <a:lstStyle/>
+          <a:p>
+            <a:pPr algn="ctr"/>
+            <a:endParaRPr lang="en-PH"/>
+          </a:p>
+        </p:txBody>
+      </p:sp>
+      <p:sp>
+        <p:nvSpPr>
+          <p:cNvPr id="6" name="Rectangle 5">
+            <a:extLst>
+              <a:ext uri="{FF2B5EF4-FFF2-40B4-BE49-F238E27FC236}">
+                <a16:creationId xmlns:a16="http://schemas.microsoft.com/office/drawing/2014/main" id="{D9137B5D-8A31-44A5-A658-266A0DF88425}"/>
+              </a:ext>
+            </a:extLst>
+          </p:cNvPr>
+          <p:cNvSpPr/>
+          <p:nvPr/>
+        </p:nvSpPr>
+        <p:spPr>
+          <a:xfrm>
+            <a:off x="152400" y="2254985"/>
+            <a:ext cx="5791200" cy="1013149"/>
+          </a:xfrm>
+          <a:prstGeom prst="rect">
+            <a:avLst/>
+          </a:prstGeom>
+        </p:spPr>
+        <p:style>
+          <a:lnRef idx="2">
+            <a:schemeClr val="accent1">
+              <a:shade val="50000"/>
+            </a:schemeClr>
+          </a:lnRef>
+          <a:fillRef idx="1">
+            <a:schemeClr val="accent1"/>
+          </a:fillRef>
+          <a:effectRef idx="0">
+            <a:schemeClr val="accent1"/>
+          </a:effectRef>
+          <a:fontRef idx="minor">
+            <a:schemeClr val="lt1"/>
+          </a:fontRef>
+        </p:style>
+        <p:txBody>
+          <a:bodyPr rtlCol="0" anchor="ctr"/>
+          <a:lstStyle/>
+          <a:p>
+            <a:pPr algn="ctr"/>
+            <a:endParaRPr lang="en-PH"/>
+          </a:p>
+        </p:txBody>
+      </p:sp>
+      <p:sp>
+        <p:nvSpPr>
+          <p:cNvPr id="7" name="Rectangle 6">
+            <a:extLst>
+              <a:ext uri="{FF2B5EF4-FFF2-40B4-BE49-F238E27FC236}">
+                <a16:creationId xmlns:a16="http://schemas.microsoft.com/office/drawing/2014/main" id="{FAFDC136-5A5F-47C4-B8DD-EA41EAA66C45}"/>
+              </a:ext>
+            </a:extLst>
+          </p:cNvPr>
+          <p:cNvSpPr/>
+          <p:nvPr/>
+        </p:nvSpPr>
+        <p:spPr>
+          <a:xfrm>
+            <a:off x="152400" y="3443170"/>
+            <a:ext cx="3390900" cy="778845"/>
+          </a:xfrm>
+          <a:prstGeom prst="rect">
+            <a:avLst/>
+          </a:prstGeom>
+        </p:spPr>
+        <p:style>
+          <a:lnRef idx="2">
+            <a:schemeClr val="accent1">
+              <a:shade val="50000"/>
+            </a:schemeClr>
+          </a:lnRef>
+          <a:fillRef idx="1">
+            <a:schemeClr val="accent1"/>
+          </a:fillRef>
+          <a:effectRef idx="0">
+            <a:schemeClr val="accent1"/>
+          </a:effectRef>
+          <a:fontRef idx="minor">
+            <a:schemeClr val="lt1"/>
+          </a:fontRef>
+        </p:style>
+        <p:txBody>
+          <a:bodyPr rtlCol="0" anchor="ctr"/>
+          <a:lstStyle/>
+          <a:p>
+            <a:pPr algn="ctr"/>
+            <a:endParaRPr lang="en-PH"/>
+          </a:p>
+        </p:txBody>
+      </p:sp>
+      <p:sp>
+        <p:nvSpPr>
+          <p:cNvPr id="8" name="Rectangle 7">
+            <a:extLst>
+              <a:ext uri="{FF2B5EF4-FFF2-40B4-BE49-F238E27FC236}">
+                <a16:creationId xmlns:a16="http://schemas.microsoft.com/office/drawing/2014/main" id="{BC42944B-D7F4-48AD-8942-F7FFFD6CAE5B}"/>
+              </a:ext>
+            </a:extLst>
+          </p:cNvPr>
+          <p:cNvSpPr/>
+          <p:nvPr/>
+        </p:nvSpPr>
+        <p:spPr>
+          <a:xfrm>
+            <a:off x="152400" y="4343399"/>
+            <a:ext cx="3390900" cy="778845"/>
+          </a:xfrm>
+          <a:prstGeom prst="rect">
+            <a:avLst/>
+          </a:prstGeom>
+        </p:spPr>
+        <p:style>
+          <a:lnRef idx="2">
+            <a:schemeClr val="accent1">
+              <a:shade val="50000"/>
+            </a:schemeClr>
+          </a:lnRef>
+          <a:fillRef idx="1">
+            <a:schemeClr val="accent1"/>
+          </a:fillRef>
+          <a:effectRef idx="0">
+            <a:schemeClr val="accent1"/>
+          </a:effectRef>
+          <a:fontRef idx="minor">
+            <a:schemeClr val="lt1"/>
+          </a:fontRef>
+        </p:style>
+        <p:txBody>
+          <a:bodyPr rtlCol="0" anchor="ctr"/>
+          <a:lstStyle/>
+          <a:p>
+            <a:pPr algn="ctr"/>
+            <a:endParaRPr lang="en-PH"/>
+          </a:p>
+        </p:txBody>
+      </p:sp>
+      <p:sp>
+        <p:nvSpPr>
+          <p:cNvPr id="9" name="Rectangle 8">
+            <a:extLst>
+              <a:ext uri="{FF2B5EF4-FFF2-40B4-BE49-F238E27FC236}">
+                <a16:creationId xmlns:a16="http://schemas.microsoft.com/office/drawing/2014/main" id="{3A52862F-0841-4588-8FA0-BA552C14C1BD}"/>
+              </a:ext>
+            </a:extLst>
+          </p:cNvPr>
+          <p:cNvSpPr/>
+          <p:nvPr/>
+        </p:nvSpPr>
+        <p:spPr>
+          <a:xfrm>
+            <a:off x="152400" y="6324600"/>
+            <a:ext cx="4216400" cy="626533"/>
+          </a:xfrm>
+          <a:prstGeom prst="rect">
+            <a:avLst/>
+          </a:prstGeom>
+        </p:spPr>
+        <p:style>
+          <a:lnRef idx="2">
+            <a:schemeClr val="accent1">
+              <a:shade val="50000"/>
+            </a:schemeClr>
+          </a:lnRef>
+          <a:fillRef idx="1">
+            <a:schemeClr val="accent1"/>
+          </a:fillRef>
+          <a:effectRef idx="0">
+            <a:schemeClr val="accent1"/>
+          </a:effectRef>
+          <a:fontRef idx="minor">
+            <a:schemeClr val="lt1"/>
+          </a:fontRef>
+        </p:style>
+        <p:txBody>
+          <a:bodyPr rtlCol="0" anchor="ctr"/>
+          <a:lstStyle/>
+          <a:p>
+            <a:pPr algn="ctr"/>
+            <a:endParaRPr lang="en-PH"/>
+          </a:p>
+        </p:txBody>
+      </p:sp>
+      <p:sp>
+        <p:nvSpPr>
+          <p:cNvPr id="10" name="Rectangle 9">
+            <a:extLst>
+              <a:ext uri="{FF2B5EF4-FFF2-40B4-BE49-F238E27FC236}">
+                <a16:creationId xmlns:a16="http://schemas.microsoft.com/office/drawing/2014/main" id="{55828EB6-7CF0-4D9D-B751-97FD81364CB5}"/>
+              </a:ext>
+            </a:extLst>
+          </p:cNvPr>
+          <p:cNvSpPr/>
+          <p:nvPr/>
+        </p:nvSpPr>
+        <p:spPr>
+          <a:xfrm>
+            <a:off x="152400" y="8017932"/>
+            <a:ext cx="4216400" cy="626533"/>
+          </a:xfrm>
+          <a:prstGeom prst="rect">
+            <a:avLst/>
+          </a:prstGeom>
+        </p:spPr>
+        <p:style>
+          <a:lnRef idx="2">
+            <a:schemeClr val="accent1">
+              <a:shade val="50000"/>
+            </a:schemeClr>
+          </a:lnRef>
+          <a:fillRef idx="1">
+            <a:schemeClr val="accent1"/>
+          </a:fillRef>
+          <a:effectRef idx="0">
+            <a:schemeClr val="accent1"/>
+          </a:effectRef>
+          <a:fontRef idx="minor">
+            <a:schemeClr val="lt1"/>
+          </a:fontRef>
+        </p:style>
+        <p:txBody>
+          <a:bodyPr rtlCol="0" anchor="ctr"/>
+          <a:lstStyle/>
+          <a:p>
+            <a:pPr algn="ctr"/>
+            <a:endParaRPr lang="en-PH"/>
+          </a:p>
+        </p:txBody>
+      </p:sp>
+    </p:spTree>
+    <p:extLst>
+      <p:ext uri="{BB962C8B-B14F-4D97-AF65-F5344CB8AC3E}">
+        <p14:creationId xmlns:p14="http://schemas.microsoft.com/office/powerpoint/2010/main" val="2966389698"/>
+      </p:ext>
+    </p:extLst>
+  </p:cSld>
+  <p:clrMapOvr>
+    <a:masterClrMapping/>
+  </p:clrMapOvr>
+</p:sld>
+</file>
+
+<file path=ppt/slides/slide2.xml><?xml version="1.0" encoding="utf-8"?>
+<p:sld xmlns:a="http://schemas.openxmlformats.org/drawingml/2006/main" xmlns:r="http://schemas.openxmlformats.org/officeDocument/2006/relationships" xmlns:p="http://schemas.openxmlformats.org/presentationml/2006/main">
+  <p:cSld>
+    <p:spTree>
+      <p:nvGrpSpPr>
+        <p:cNvPr id="1" name=""/>
+        <p:cNvGrpSpPr/>
+        <p:nvPr/>
+      </p:nvGrpSpPr>
+      <p:grpSpPr>
+        <a:xfrm>
+          <a:off x="0" y="0"/>
+          <a:ext cx="0" cy="0"/>
+          <a:chOff x="0" y="0"/>
+          <a:chExt cx="0" cy="0"/>
+        </a:xfrm>
+      </p:grpSpPr>
+    </p:spTree>
+    <p:extLst>
+      <p:ext uri="{BB962C8B-B14F-4D97-AF65-F5344CB8AC3E}">
+        <p14:creationId xmlns:p14="http://schemas.microsoft.com/office/powerpoint/2010/main" val="589962416"/>
+      </p:ext>
+    </p:extLst>
+  </p:cSld>
+  <p:clrMapOvr>
+    <a:masterClrMapping/>
+  </p:clrMapOvr>
+</p:sld>
+</file>
+
+<file path=ppt/slides/slide3.xml><?xml version="1.0" encoding="utf-8"?>
+<p:sld xmlns:a="http://schemas.openxmlformats.org/drawingml/2006/main" xmlns:r="http://schemas.openxmlformats.org/officeDocument/2006/relationships" xmlns:p="http://schemas.openxmlformats.org/presentationml/2006/main">
+  <p:cSld>
+    <p:spTree>
+      <p:nvGrpSpPr>
+        <p:cNvPr id="1" name=""/>
+        <p:cNvGrpSpPr/>
+        <p:nvPr/>
+      </p:nvGrpSpPr>
+      <p:grpSpPr>
+        <a:xfrm>
+          <a:off x="0" y="0"/>
+          <a:ext cx="0" cy="0"/>
+          <a:chOff x="0" y="0"/>
+          <a:chExt cx="0" cy="0"/>
+        </a:xfrm>
+      </p:grpSpPr>
+      <p:pic>
+        <p:nvPicPr>
+          <p:cNvPr id="3" name="Picture 2">
+            <a:extLst>
+              <a:ext uri="{FF2B5EF4-FFF2-40B4-BE49-F238E27FC236}">
                 <a16:creationId xmlns:a16="http://schemas.microsoft.com/office/drawing/2014/main" id="{9CD002C8-BA50-4EF6-B1CB-DCCB17856B92}"/>
               </a:ext>
             </a:extLst>
@@ -3021,7 +3487,7 @@
 </p:sld>
 </file>
 
-<file path=ppt/slides/slide2.xml><?xml version="1.0" encoding="utf-8"?>
+<file path=ppt/slides/slide4.xml><?xml version="1.0" encoding="utf-8"?>
 <p:sld xmlns:a="http://schemas.openxmlformats.org/drawingml/2006/main" xmlns:r="http://schemas.openxmlformats.org/officeDocument/2006/relationships" xmlns:p="http://schemas.openxmlformats.org/presentationml/2006/main">
   <p:cSld>
     <p:spTree>

</xml_diff>